<commit_message>
Updated Phase 1 Project
</commit_message>
<xml_diff>
--- a/MICROSOFT MOVIE STUDIO PPT.pptx
+++ b/MICROSOFT MOVIE STUDIO PPT.pptx
@@ -8,8 +8,8 @@
     <p:sldId id="256" r:id="rId2"/>
     <p:sldId id="257" r:id="rId3"/>
     <p:sldId id="258" r:id="rId4"/>
-    <p:sldId id="259" r:id="rId5"/>
-    <p:sldId id="260" r:id="rId6"/>
+    <p:sldId id="271" r:id="rId5"/>
+    <p:sldId id="259" r:id="rId6"/>
     <p:sldId id="261" r:id="rId7"/>
     <p:sldId id="262" r:id="rId8"/>
     <p:sldId id="263" r:id="rId9"/>
@@ -118,6 +118,11 @@
       </a:defRPr>
     </a:lvl9pPr>
   </p:defaultTextStyle>
+  <p:extLst>
+    <p:ext uri="{EFAFB233-063F-42B5-8137-9DF3F51BA10A}">
+      <p15:sldGuideLst xmlns:p15="http://schemas.microsoft.com/office/powerpoint/2012/main"/>
+    </p:ext>
+  </p:extLst>
 </p:presentation>
 </file>
 
@@ -13261,7 +13266,6 @@
               <a:rPr lang="en-US" sz="2800" dirty="0"/>
               <a:t>Redefining Cinematic Excellence</a:t>
             </a:r>
-            <a:endParaRPr lang="en-US" sz="2800" dirty="0"/>
           </a:p>
         </p:txBody>
       </p:sp>
@@ -13336,17 +13340,94 @@
           </a:bodyPr>
           <a:lstStyle/>
           <a:p>
-            <a:r>
-              <a:rPr lang="en-GB" sz="1400" dirty="0"/>
-              <a:t>April had the highest </a:t>
-            </a:r>
-            <a:r>
-              <a:rPr lang="en-GB" sz="1400" dirty="0" err="1"/>
-              <a:t>roi</a:t>
-            </a:r>
-            <a:r>
-              <a:rPr lang="en-GB" sz="1400" dirty="0"/>
-              <a:t> followed by July, December, May, November, June and January respectively. Having a closer look at the month of April, I see that despite not being the month with the highest genre releases, with the genre released in that month being a combination of Comedy, Drama and Horror with its director being Graham Wright.</a:t>
+            <a:pPr marL="0" indent="0">
+              <a:buNone/>
+            </a:pPr>
+            <a:r>
+              <a:rPr lang="en-US" b="1" dirty="0"/>
+              <a:t>ROI by Month</a:t>
+            </a:r>
+            <a:endParaRPr lang="en-GB" dirty="0" smtClean="0"/>
+          </a:p>
+          <a:p>
+            <a:pPr marL="0" indent="0">
+              <a:buNone/>
+            </a:pPr>
+            <a:r>
+              <a:rPr lang="en-GB" dirty="0" smtClean="0"/>
+              <a:t>April</a:t>
+            </a:r>
+            <a:r>
+              <a:rPr lang="en-GB" dirty="0"/>
+              <a:t>: Highest ROI</a:t>
+            </a:r>
+          </a:p>
+          <a:p>
+            <a:pPr marL="0" indent="0">
+              <a:buNone/>
+            </a:pPr>
+            <a:r>
+              <a:rPr lang="en-GB" dirty="0" smtClean="0"/>
+              <a:t>February: </a:t>
+            </a:r>
+            <a:r>
+              <a:rPr lang="en-GB" dirty="0"/>
+              <a:t>Second Highest</a:t>
+            </a:r>
+          </a:p>
+          <a:p>
+            <a:pPr marL="0" indent="0">
+              <a:buNone/>
+            </a:pPr>
+            <a:r>
+              <a:rPr lang="en-GB" dirty="0" smtClean="0"/>
+              <a:t>November: </a:t>
+            </a:r>
+            <a:r>
+              <a:rPr lang="en-GB" dirty="0"/>
+              <a:t>Third </a:t>
+            </a:r>
+            <a:r>
+              <a:rPr lang="en-GB" dirty="0" smtClean="0"/>
+              <a:t>Highest</a:t>
+            </a:r>
+          </a:p>
+          <a:p>
+            <a:pPr marL="0" indent="0">
+              <a:buNone/>
+            </a:pPr>
+            <a:endParaRPr lang="en-GB" dirty="0"/>
+          </a:p>
+          <a:p>
+            <a:pPr marL="0" indent="0">
+              <a:buNone/>
+            </a:pPr>
+            <a:r>
+              <a:rPr lang="en-GB" b="1" dirty="0" smtClean="0"/>
+              <a:t>April's </a:t>
+            </a:r>
+            <a:r>
+              <a:rPr lang="en-GB" b="1" dirty="0"/>
+              <a:t>Success</a:t>
+            </a:r>
+            <a:endParaRPr lang="en-GB" dirty="0"/>
+          </a:p>
+          <a:p>
+            <a:pPr marL="0" indent="0">
+              <a:buNone/>
+            </a:pPr>
+            <a:r>
+              <a:rPr lang="en-GB" dirty="0"/>
+              <a:t>Genre: Comedy, Drama, Horror</a:t>
+            </a:r>
+          </a:p>
+          <a:p>
+            <a:pPr marL="0" indent="0">
+              <a:buNone/>
+            </a:pPr>
+            <a:r>
+              <a:rPr lang="en-GB" dirty="0"/>
+              <a:t>Director: Graham Wright</a:t>
             </a:r>
           </a:p>
         </p:txBody>
@@ -13373,8 +13454,8 @@
         </p:blipFill>
         <p:spPr>
           <a:xfrm>
-            <a:off x="1699491" y="3083397"/>
-            <a:ext cx="8802254" cy="3668385"/>
+            <a:off x="6354618" y="2274834"/>
+            <a:ext cx="5449454" cy="4262589"/>
           </a:xfrm>
           <a:prstGeom prst="rect">
             <a:avLst/>
@@ -13562,8 +13643,16 @@
           <a:lstStyle/>
           <a:p>
             <a:r>
+              <a:rPr lang="en-GB" dirty="0" smtClean="0"/>
+              <a:t>This is a heat </a:t>
+            </a:r>
+            <a:r>
               <a:rPr lang="en-GB" dirty="0"/>
-              <a:t>The below heat map shows </a:t>
+              <a:t>map </a:t>
+            </a:r>
+            <a:r>
+              <a:rPr lang="en-GB" dirty="0" smtClean="0"/>
+              <a:t>showing </a:t>
             </a:r>
             <a:endParaRPr lang="en-GB" dirty="0" smtClean="0"/>
           </a:p>
@@ -13920,50 +14009,24 @@
           </a:xfrm>
         </p:spPr>
         <p:txBody>
-          <a:bodyPr/>
+          <a:bodyPr>
+            <a:normAutofit fontScale="92500" lnSpcReduction="20000"/>
+          </a:bodyPr>
           <a:lstStyle/>
           <a:p>
             <a:r>
-              <a:rPr lang="en-GB" dirty="0" smtClean="0"/>
-              <a:t>Top </a:t>
-            </a:r>
+              <a:rPr lang="en-GB" b="1" dirty="0"/>
+              <a:t>Top 30 Directors with Highest ROI</a:t>
+            </a:r>
+            <a:endParaRPr lang="en-GB" dirty="0"/>
+          </a:p>
+          <a:p>
+            <a:pPr marL="0" indent="0">
+              <a:buNone/>
+            </a:pPr>
             <a:r>
               <a:rPr lang="en-GB" dirty="0"/>
-              <a:t>30 directors with the highest </a:t>
-            </a:r>
-            <a:r>
-              <a:rPr lang="en-GB" dirty="0" smtClean="0"/>
-              <a:t>ROI</a:t>
-            </a:r>
-          </a:p>
-          <a:p>
-            <a:pPr marL="0" indent="0">
-              <a:buNone/>
-            </a:pPr>
-            <a:r>
-              <a:rPr lang="en-GB" dirty="0" smtClean="0"/>
-              <a:t> </a:t>
-            </a:r>
-            <a:r>
-              <a:rPr lang="en-GB" dirty="0"/>
-              <a:t>in our dataset directed </a:t>
-            </a:r>
-            <a:r>
-              <a:rPr lang="en-GB" dirty="0" smtClean="0"/>
-              <a:t>movies</a:t>
-            </a:r>
-          </a:p>
-          <a:p>
-            <a:pPr marL="0" indent="0">
-              <a:buNone/>
-            </a:pPr>
-            <a:r>
-              <a:rPr lang="en-GB" dirty="0" smtClean="0"/>
-              <a:t> </a:t>
-            </a:r>
-            <a:r>
-              <a:rPr lang="en-GB" dirty="0"/>
-              <a:t>with genres as follows Biography, </a:t>
+              <a:t>Directed Movies with Genres: Biography, </a:t>
             </a:r>
             <a:endParaRPr lang="en-GB" dirty="0" smtClean="0"/>
           </a:p>
@@ -13991,7 +14054,7 @@
             </a:r>
             <a:r>
               <a:rPr lang="en-GB" dirty="0"/>
-              <a:t>, Horror, Animation, Family, Sport, </a:t>
+              <a:t>, Horror, Animation, </a:t>
             </a:r>
             <a:endParaRPr lang="en-GB" dirty="0" smtClean="0"/>
           </a:p>
@@ -14001,41 +14064,58 @@
             </a:pPr>
             <a:r>
               <a:rPr lang="en-GB" dirty="0" smtClean="0"/>
-              <a:t>Fantasy </a:t>
+              <a:t>Family</a:t>
             </a:r>
             <a:r>
               <a:rPr lang="en-GB" dirty="0"/>
-              <a:t>and Musical. Their main release </a:t>
-            </a:r>
-            <a:endParaRPr lang="en-GB" dirty="0" smtClean="0"/>
+              <a:t>, Sport, Fantasy, and Musical.</a:t>
+            </a:r>
           </a:p>
           <a:p>
             <a:pPr marL="0" indent="0">
               <a:buNone/>
             </a:pPr>
             <a:r>
-              <a:rPr lang="en-GB" dirty="0" smtClean="0"/>
-              <a:t>months </a:t>
-            </a:r>
+              <a:rPr lang="en-GB" b="1" dirty="0"/>
+              <a:t>Main Release Months:</a:t>
+            </a:r>
+            <a:endParaRPr lang="en-GB" dirty="0"/>
+          </a:p>
+          <a:p>
             <a:r>
               <a:rPr lang="en-GB" dirty="0"/>
-              <a:t>are January, February, March, </a:t>
-            </a:r>
-            <a:endParaRPr lang="en-GB" dirty="0" smtClean="0"/>
-          </a:p>
-          <a:p>
-            <a:pPr marL="0" indent="0">
-              <a:buNone/>
-            </a:pPr>
-            <a:r>
-              <a:rPr lang="en-GB" dirty="0" smtClean="0"/>
+              <a:t>January</a:t>
+            </a:r>
+          </a:p>
+          <a:p>
+            <a:r>
+              <a:rPr lang="en-GB" dirty="0"/>
+              <a:t>February</a:t>
+            </a:r>
+          </a:p>
+          <a:p>
+            <a:r>
+              <a:rPr lang="en-GB" dirty="0"/>
+              <a:t>March</a:t>
+            </a:r>
+          </a:p>
+          <a:p>
+            <a:r>
+              <a:rPr lang="en-GB" dirty="0"/>
               <a:t>October</a:t>
             </a:r>
+          </a:p>
+          <a:p>
             <a:r>
               <a:rPr lang="en-GB" dirty="0"/>
-              <a:t>, November and December.</a:t>
-            </a:r>
-            <a:endParaRPr lang="en-US" dirty="0"/>
+              <a:t>November</a:t>
+            </a:r>
+          </a:p>
+          <a:p>
+            <a:r>
+              <a:rPr lang="en-GB" dirty="0"/>
+              <a:t>December</a:t>
+            </a:r>
           </a:p>
         </p:txBody>
       </p:sp>
@@ -14381,34 +14461,69 @@
           </a:xfrm>
         </p:spPr>
         <p:txBody>
-          <a:bodyPr/>
+          <a:bodyPr>
+            <a:normAutofit/>
+          </a:bodyPr>
           <a:lstStyle/>
           <a:p>
             <a:pPr marL="0" indent="0">
               <a:buNone/>
             </a:pPr>
             <a:r>
-              <a:rPr lang="en-GB" dirty="0" smtClean="0"/>
-              <a:t>Microsoft is looking to venture into the movie industry and they want it to be profitable and rival the other players in the industry.</a:t>
+              <a:rPr lang="en-US" dirty="0" smtClean="0"/>
+              <a:t>Venturing </a:t>
+            </a:r>
+            <a:r>
+              <a:rPr lang="en-US" dirty="0"/>
+              <a:t>into the Movie Industry: Microsoft's Profitable Path</a:t>
+            </a:r>
+          </a:p>
+          <a:p>
+            <a:r>
+              <a:rPr lang="en-US" b="1" dirty="0" smtClean="0"/>
+              <a:t>Objective</a:t>
+            </a:r>
+            <a:r>
+              <a:rPr lang="en-US" b="1" dirty="0"/>
+              <a:t>:</a:t>
+            </a:r>
+            <a:r>
+              <a:rPr lang="en-US" dirty="0"/>
+              <a:t> Microsoft's Movie Industry Entry</a:t>
+            </a:r>
+          </a:p>
+          <a:p>
+            <a:r>
+              <a:rPr lang="en-US" b="1" dirty="0" smtClean="0"/>
+              <a:t>Analyzing </a:t>
+            </a:r>
+            <a:r>
+              <a:rPr lang="en-US" b="1" dirty="0"/>
+              <a:t>Success Factors:</a:t>
+            </a:r>
+            <a:r>
+              <a:rPr lang="en-US" dirty="0"/>
+              <a:t> ROI, Genre, Star Appeal</a:t>
+            </a:r>
+          </a:p>
+          <a:p>
+            <a:r>
+              <a:rPr lang="en-US" b="1" dirty="0" smtClean="0"/>
+              <a:t>Profitable </a:t>
+            </a:r>
+            <a:r>
+              <a:rPr lang="en-US" b="1" dirty="0"/>
+              <a:t>Rivalry:</a:t>
+            </a:r>
+            <a:r>
+              <a:rPr lang="en-US" dirty="0"/>
+              <a:t> Unveiling Studio's Success Secrets</a:t>
             </a:r>
           </a:p>
           <a:p>
             <a:pPr marL="0" indent="0">
               <a:buNone/>
             </a:pPr>
-            <a:r>
-              <a:rPr lang="en-GB" dirty="0" smtClean="0"/>
-              <a:t>It is my role to analyse data from other movie site to bring out the factors that make a movie studio stand out and capture its customers’ attention.</a:t>
-            </a:r>
-          </a:p>
-          <a:p>
-            <a:pPr marL="0" indent="0">
-              <a:buNone/>
-            </a:pPr>
-            <a:r>
-              <a:rPr lang="en-GB" dirty="0" smtClean="0"/>
-              <a:t>To achieve this, we look at how the ROI, Genre and star appeal add up to a studio’s success.</a:t>
-            </a:r>
             <a:endParaRPr lang="en-GB" dirty="0"/>
           </a:p>
         </p:txBody>
@@ -14460,7 +14575,7 @@
           <a:p>
             <a:r>
               <a:rPr lang="en-GB" dirty="0" smtClean="0"/>
-              <a:t>Data</a:t>
+              <a:t>Methods</a:t>
             </a:r>
             <a:endParaRPr lang="en-US" dirty="0"/>
           </a:p>
@@ -14478,117 +14593,118 @@
         </p:nvSpPr>
         <p:spPr/>
         <p:txBody>
-          <a:bodyPr/>
+          <a:bodyPr>
+            <a:normAutofit lnSpcReduction="10000"/>
+          </a:bodyPr>
           <a:lstStyle/>
           <a:p>
             <a:pPr marL="0" indent="0">
               <a:buNone/>
             </a:pPr>
             <a:r>
+              <a:rPr lang="en-GB" b="1" dirty="0" smtClean="0"/>
+              <a:t>Data </a:t>
+            </a:r>
+            <a:r>
+              <a:rPr lang="en-GB" b="1" dirty="0"/>
+              <a:t>Preparation and Cleaning</a:t>
+            </a:r>
+            <a:endParaRPr lang="en-GB" dirty="0"/>
+          </a:p>
+          <a:p>
+            <a:r>
               <a:rPr lang="en-GB" dirty="0"/>
-              <a:t>For this project, I </a:t>
+              <a:t>Acquiring and Organizing Data</a:t>
+            </a:r>
+          </a:p>
+          <a:p>
+            <a:r>
+              <a:rPr lang="en-GB" dirty="0"/>
+              <a:t>Enhancing Data Relevance with </a:t>
             </a:r>
             <a:r>
               <a:rPr lang="en-GB" dirty="0" smtClean="0"/>
-              <a:t>utilized </a:t>
-            </a:r>
+              <a:t>SQL</a:t>
+            </a:r>
+          </a:p>
+          <a:p>
+            <a:pPr marL="0" indent="0">
+              <a:buNone/>
+            </a:pPr>
+            <a:r>
+              <a:rPr lang="en-GB" b="1" dirty="0" smtClean="0"/>
+              <a:t>Data </a:t>
+            </a:r>
+            <a:r>
+              <a:rPr lang="en-GB" b="1" dirty="0"/>
+              <a:t>Cleaning Process</a:t>
+            </a:r>
+            <a:endParaRPr lang="en-GB" dirty="0"/>
+          </a:p>
+          <a:p>
             <a:r>
               <a:rPr lang="en-GB" dirty="0"/>
-              <a:t>data from </a:t>
+              <a:t>Converting Financial Values</a:t>
+            </a:r>
+          </a:p>
+          <a:p>
+            <a:r>
+              <a:rPr lang="en-GB" dirty="0"/>
+              <a:t>Eliminating Duplicates and Missing </a:t>
             </a:r>
             <a:r>
               <a:rPr lang="en-GB" dirty="0" smtClean="0"/>
-              <a:t>the following sources:</a:t>
-            </a:r>
-          </a:p>
-          <a:p>
-            <a:pPr>
-              <a:buFont typeface="Wingdings" panose="05000000000000000000" pitchFamily="2" charset="2"/>
-              <a:buChar char="Ø"/>
+              <a:t>Data</a:t>
+            </a:r>
+          </a:p>
+          <a:p>
+            <a:pPr marL="0" indent="0">
+              <a:buNone/>
             </a:pPr>
             <a:r>
-              <a:rPr lang="en-GB" dirty="0" smtClean="0"/>
-              <a:t>Box </a:t>
-            </a:r>
+              <a:rPr lang="en-GB" b="1" dirty="0" smtClean="0"/>
+              <a:t>ROI </a:t>
+            </a:r>
+            <a:r>
+              <a:rPr lang="en-GB" b="1" dirty="0"/>
+              <a:t>Calculation and Visualization</a:t>
+            </a:r>
+            <a:endParaRPr lang="en-GB" dirty="0"/>
+          </a:p>
+          <a:p>
             <a:r>
               <a:rPr lang="en-GB" dirty="0"/>
-              <a:t>Office </a:t>
-            </a:r>
-            <a:r>
-              <a:rPr lang="en-GB" dirty="0" smtClean="0"/>
-              <a:t>Mojo </a:t>
-            </a:r>
-          </a:p>
-          <a:p>
-            <a:pPr>
-              <a:buFont typeface="Wingdings" panose="05000000000000000000" pitchFamily="2" charset="2"/>
-              <a:buChar char="Ø"/>
-            </a:pPr>
-            <a:r>
-              <a:rPr lang="en-GB" dirty="0" smtClean="0"/>
-              <a:t>IMDB</a:t>
-            </a:r>
+              <a:t>Introducing ROI Column</a:t>
+            </a:r>
+          </a:p>
+          <a:p>
             <a:r>
               <a:rPr lang="en-GB" dirty="0"/>
-              <a:t>, Rotten </a:t>
-            </a:r>
-            <a:r>
-              <a:rPr lang="en-GB" dirty="0" smtClean="0"/>
-              <a:t>Tomatoes </a:t>
-            </a:r>
-          </a:p>
-          <a:p>
-            <a:pPr>
-              <a:buFont typeface="Wingdings" panose="05000000000000000000" pitchFamily="2" charset="2"/>
-              <a:buChar char="Ø"/>
-            </a:pPr>
-            <a:r>
-              <a:rPr lang="en-GB" dirty="0" err="1" smtClean="0"/>
-              <a:t>TheMovieDB</a:t>
-            </a:r>
-            <a:r>
-              <a:rPr lang="en-GB" dirty="0" smtClean="0"/>
-              <a:t> </a:t>
-            </a:r>
-          </a:p>
-          <a:p>
-            <a:pPr>
-              <a:buFont typeface="Wingdings" panose="05000000000000000000" pitchFamily="2" charset="2"/>
-              <a:buChar char="Ø"/>
-            </a:pPr>
-            <a:r>
-              <a:rPr lang="en-GB" dirty="0" smtClean="0"/>
-              <a:t>The Numbers </a:t>
-            </a:r>
-          </a:p>
-          <a:p>
-            <a:pPr marL="0" indent="0">
-              <a:buNone/>
-            </a:pPr>
-            <a:r>
-              <a:rPr lang="en-GB" dirty="0" smtClean="0"/>
-              <a:t>This </a:t>
+              <a:t>Visualizing Data with </a:t>
+            </a:r>
+            <a:r>
+              <a:rPr lang="en-GB" dirty="0" err="1"/>
+              <a:t>matplotlib</a:t>
             </a:r>
             <a:r>
               <a:rPr lang="en-GB" dirty="0"/>
-              <a:t>data encompasses comprehensive details about movies, such as the key individuals involved in production, </a:t>
-            </a:r>
-            <a:r>
-              <a:rPr lang="en-GB" dirty="0" smtClean="0"/>
-              <a:t>genres </a:t>
-            </a:r>
-            <a:r>
-              <a:rPr lang="en-GB" dirty="0"/>
-              <a:t>and financial metrics</a:t>
-            </a:r>
-            <a:endParaRPr lang="en-US" dirty="0"/>
+              <a:t> and </a:t>
+            </a:r>
+            <a:r>
+              <a:rPr lang="en-GB" dirty="0" err="1"/>
+              <a:t>seaborn</a:t>
+            </a:r>
+            <a:endParaRPr lang="en-GB" dirty="0"/>
+          </a:p>
+          <a:p>
+            <a:endParaRPr lang="en-GB" dirty="0"/>
           </a:p>
         </p:txBody>
       </p:sp>
     </p:spTree>
     <p:extLst>
       <p:ext uri="{BB962C8B-B14F-4D97-AF65-F5344CB8AC3E}">
-        <p14:creationId xmlns:p14="http://schemas.microsoft.com/office/powerpoint/2010/main" val="3783169875"/>
+        <p14:creationId xmlns:p14="http://schemas.microsoft.com/office/powerpoint/2010/main" val="3771033550"/>
       </p:ext>
     </p:extLst>
   </p:cSld>
@@ -14632,7 +14748,7 @@
           <a:p>
             <a:r>
               <a:rPr lang="en-GB" dirty="0" smtClean="0"/>
-              <a:t>Method</a:t>
+              <a:t>Data</a:t>
             </a:r>
             <a:endParaRPr lang="en-US" dirty="0"/>
           </a:p>
@@ -14658,139 +14774,100 @@
             </a:pPr>
             <a:r>
               <a:rPr lang="en-GB" dirty="0"/>
-              <a:t>The first step involved acquiring the necessary data and organizing it into </a:t>
-            </a:r>
-            <a:r>
-              <a:rPr lang="en-GB" dirty="0" err="1">
-                <a:solidFill>
-                  <a:srgbClr val="FF0000"/>
-                </a:solidFill>
-              </a:rPr>
-              <a:t>DataFrames</a:t>
+              <a:t>For this project, I </a:t>
+            </a:r>
+            <a:r>
+              <a:rPr lang="en-GB" dirty="0" smtClean="0"/>
+              <a:t>utilized </a:t>
             </a:r>
             <a:r>
               <a:rPr lang="en-GB" dirty="0"/>
-              <a:t>. Although the initial data lacked significant utility on its own, I used </a:t>
-            </a:r>
-            <a:r>
-              <a:rPr lang="en-GB" dirty="0">
-                <a:solidFill>
-                  <a:srgbClr val="FF0000"/>
-                </a:solidFill>
-              </a:rPr>
-              <a:t>SQL </a:t>
+              <a:t>data from </a:t>
+            </a:r>
+            <a:r>
+              <a:rPr lang="en-GB" dirty="0" smtClean="0"/>
+              <a:t>the following sources:</a:t>
+            </a:r>
+          </a:p>
+          <a:p>
+            <a:pPr>
+              <a:buFont typeface="Wingdings" panose="05000000000000000000" pitchFamily="2" charset="2"/>
+              <a:buChar char="Ø"/>
+            </a:pPr>
+            <a:r>
+              <a:rPr lang="en-GB" dirty="0" smtClean="0"/>
+              <a:t>Box </a:t>
             </a:r>
             <a:r>
               <a:rPr lang="en-GB" dirty="0"/>
-              <a:t>to </a:t>
-            </a:r>
-            <a:r>
-              <a:rPr lang="en-GB" dirty="0">
-                <a:solidFill>
-                  <a:srgbClr val="FF0000"/>
-                </a:solidFill>
-              </a:rPr>
-              <a:t>merge</a:t>
+              <a:t>Office </a:t>
+            </a:r>
+            <a:r>
+              <a:rPr lang="en-GB" dirty="0" smtClean="0"/>
+              <a:t>Mojo </a:t>
+            </a:r>
+          </a:p>
+          <a:p>
+            <a:pPr>
+              <a:buFont typeface="Wingdings" panose="05000000000000000000" pitchFamily="2" charset="2"/>
+              <a:buChar char="Ø"/>
+            </a:pPr>
+            <a:r>
+              <a:rPr lang="en-GB" dirty="0" smtClean="0"/>
+              <a:t>IMDB</a:t>
             </a:r>
             <a:r>
               <a:rPr lang="en-GB" dirty="0"/>
-              <a:t> the </a:t>
-            </a:r>
-            <a:r>
-              <a:rPr lang="en-GB" dirty="0" err="1"/>
-              <a:t>DataFrames</a:t>
+              <a:t>, Rotten </a:t>
+            </a:r>
+            <a:r>
+              <a:rPr lang="en-GB" dirty="0" smtClean="0"/>
+              <a:t>Tomatoes </a:t>
+            </a:r>
+          </a:p>
+          <a:p>
+            <a:pPr>
+              <a:buFont typeface="Wingdings" panose="05000000000000000000" pitchFamily="2" charset="2"/>
+              <a:buChar char="Ø"/>
+            </a:pPr>
+            <a:r>
+              <a:rPr lang="en-GB" dirty="0" err="1" smtClean="0"/>
+              <a:t>TheMovieDB</a:t>
+            </a:r>
+            <a:r>
+              <a:rPr lang="en-GB" dirty="0" smtClean="0"/>
+              <a:t> </a:t>
+            </a:r>
+          </a:p>
+          <a:p>
+            <a:pPr>
+              <a:buFont typeface="Wingdings" panose="05000000000000000000" pitchFamily="2" charset="2"/>
+              <a:buChar char="Ø"/>
+            </a:pPr>
+            <a:r>
+              <a:rPr lang="en-GB" dirty="0" smtClean="0"/>
+              <a:t>The Numbers </a:t>
+            </a:r>
+          </a:p>
+          <a:p>
+            <a:pPr marL="0" indent="0">
+              <a:buNone/>
+            </a:pPr>
+            <a:r>
+              <a:rPr lang="en-GB" dirty="0" smtClean="0"/>
+              <a:t>This </a:t>
             </a:r>
             <a:r>
               <a:rPr lang="en-GB" dirty="0"/>
-              <a:t> and enhance their relevance. </a:t>
-            </a:r>
-            <a:endParaRPr lang="en-GB" dirty="0" smtClean="0"/>
-          </a:p>
-          <a:p>
-            <a:pPr marL="0" indent="0">
-              <a:buNone/>
-            </a:pPr>
+              <a:t>data encompasses comprehensive details about movies, such as the key individuals involved in production, </a:t>
+            </a:r>
             <a:r>
               <a:rPr lang="en-GB" dirty="0" smtClean="0"/>
-              <a:t>Next</a:t>
+              <a:t>genres </a:t>
             </a:r>
             <a:r>
               <a:rPr lang="en-GB" dirty="0"/>
-              <a:t>, I performed data cleaning operations, converting financial values into floats and eliminating duplicated and missing data. </a:t>
-            </a:r>
-            <a:endParaRPr lang="en-GB" dirty="0" smtClean="0"/>
-          </a:p>
-          <a:p>
-            <a:pPr marL="0" indent="0">
-              <a:buNone/>
-            </a:pPr>
-            <a:r>
-              <a:rPr lang="en-GB" dirty="0" smtClean="0"/>
-              <a:t>To </a:t>
-            </a:r>
-            <a:r>
-              <a:rPr lang="en-GB" dirty="0"/>
-              <a:t>facilitate analysis, I introduced a </a:t>
-            </a:r>
-            <a:r>
-              <a:rPr lang="en-GB" dirty="0">
-                <a:solidFill>
-                  <a:srgbClr val="FF0000"/>
-                </a:solidFill>
-              </a:rPr>
-              <a:t>new column </a:t>
-            </a:r>
-            <a:r>
-              <a:rPr lang="en-GB" dirty="0"/>
-              <a:t>to calculate the </a:t>
-            </a:r>
-            <a:r>
-              <a:rPr lang="en-GB" dirty="0">
-                <a:solidFill>
-                  <a:srgbClr val="FF0000"/>
-                </a:solidFill>
-              </a:rPr>
-              <a:t>ROI</a:t>
-            </a:r>
-            <a:r>
-              <a:rPr lang="en-GB" dirty="0"/>
-              <a:t>. Finally, I </a:t>
-            </a:r>
-            <a:r>
-              <a:rPr lang="en-GB" dirty="0">
-                <a:solidFill>
-                  <a:srgbClr val="FF0000"/>
-                </a:solidFill>
-              </a:rPr>
-              <a:t>visualized</a:t>
-            </a:r>
-            <a:r>
-              <a:rPr lang="en-GB" dirty="0"/>
-              <a:t> the data using </a:t>
-            </a:r>
-            <a:r>
-              <a:rPr lang="en-GB" dirty="0" err="1">
-                <a:solidFill>
-                  <a:srgbClr val="FF0000"/>
-                </a:solidFill>
-              </a:rPr>
-              <a:t>matplotlib</a:t>
-            </a:r>
-            <a:r>
-              <a:rPr lang="en-GB" dirty="0"/>
-              <a:t> and </a:t>
-            </a:r>
-            <a:r>
-              <a:rPr lang="en-GB" dirty="0" err="1">
-                <a:solidFill>
-                  <a:srgbClr val="FF0000"/>
-                </a:solidFill>
-              </a:rPr>
-              <a:t>seaborn</a:t>
-            </a:r>
-            <a:r>
-              <a:rPr lang="en-GB" dirty="0"/>
-              <a:t> libraries.</a:t>
+              <a:t>and financial metrics</a:t>
             </a:r>
             <a:endParaRPr lang="en-US" dirty="0"/>
           </a:p>
@@ -14799,7 +14876,7 @@
     </p:spTree>
     <p:extLst>
       <p:ext uri="{BB962C8B-B14F-4D97-AF65-F5344CB8AC3E}">
-        <p14:creationId xmlns:p14="http://schemas.microsoft.com/office/powerpoint/2010/main" val="4258096291"/>
+        <p14:creationId xmlns:p14="http://schemas.microsoft.com/office/powerpoint/2010/main" val="3783169875"/>
       </p:ext>
     </p:extLst>
   </p:cSld>
@@ -14977,8 +15054,8 @@
         </p:nvSpPr>
         <p:spPr>
           <a:xfrm>
-            <a:off x="1154954" y="2179782"/>
-            <a:ext cx="8825659" cy="3840018"/>
+            <a:off x="1154954" y="1764145"/>
+            <a:ext cx="8825659" cy="4255656"/>
           </a:xfrm>
         </p:spPr>
         <p:txBody>
@@ -14986,46 +15063,248 @@
           <a:lstStyle/>
           <a:p>
             <a:r>
-              <a:rPr lang="en-GB" sz="1400" dirty="0"/>
-              <a:t>The first graph shows that the genre drama had the most releases followed by comedy and action while the second graph shows that the most released grouped genres are '</a:t>
-            </a:r>
-            <a:r>
-              <a:rPr lang="en-GB" sz="1400" dirty="0" err="1"/>
-              <a:t>comedy,drama</a:t>
-            </a:r>
-            <a:r>
-              <a:rPr lang="en-GB" sz="1400" dirty="0"/>
-              <a:t>', '</a:t>
-            </a:r>
-            <a:r>
-              <a:rPr lang="en-GB" sz="1400" dirty="0" err="1"/>
-              <a:t>drama,romance</a:t>
-            </a:r>
-            <a:r>
-              <a:rPr lang="en-GB" sz="1400" dirty="0"/>
-              <a:t>', '</a:t>
-            </a:r>
-            <a:r>
-              <a:rPr lang="en-GB" sz="1400" dirty="0" err="1"/>
-              <a:t>comedy,drama</a:t>
-            </a:r>
-            <a:r>
-              <a:rPr lang="en-GB" sz="1400" dirty="0"/>
-              <a:t>, romance' and '</a:t>
-            </a:r>
-            <a:r>
-              <a:rPr lang="en-GB" sz="1400" dirty="0" err="1"/>
-              <a:t>action,crime,drama</a:t>
-            </a:r>
-            <a:r>
-              <a:rPr lang="en-GB" sz="1400" dirty="0"/>
-              <a:t>'.</a:t>
-            </a:r>
-          </a:p>
-          <a:p>
-            <a:pPr marL="0" indent="0">
-              <a:buNone/>
-            </a:pPr>
+              <a:rPr lang="en-GB" sz="1600" b="1" dirty="0">
+                <a:solidFill>
+                  <a:schemeClr val="accent4">
+                    <a:lumMod val="75000"/>
+                  </a:schemeClr>
+                </a:solidFill>
+              </a:rPr>
+              <a:t>Genre </a:t>
+            </a:r>
+            <a:r>
+              <a:rPr lang="en-GB" sz="1600" b="1" dirty="0" smtClean="0">
+                <a:solidFill>
+                  <a:schemeClr val="accent4">
+                    <a:lumMod val="75000"/>
+                  </a:schemeClr>
+                </a:solidFill>
+              </a:rPr>
+              <a:t>Releases</a:t>
+            </a:r>
+            <a:r>
+              <a:rPr lang="en-GB" sz="1600" b="1" dirty="0" smtClean="0">
+                <a:solidFill>
+                  <a:schemeClr val="accent4">
+                    <a:lumMod val="60000"/>
+                    <a:lumOff val="40000"/>
+                  </a:schemeClr>
+                </a:solidFill>
+              </a:rPr>
+              <a:t>: </a:t>
+            </a:r>
+            <a:r>
+              <a:rPr lang="en-GB" sz="1600" dirty="0" smtClean="0">
+                <a:solidFill>
+                  <a:schemeClr val="accent4">
+                    <a:lumMod val="60000"/>
+                    <a:lumOff val="40000"/>
+                  </a:schemeClr>
+                </a:solidFill>
+              </a:rPr>
+              <a:t>Drama</a:t>
+            </a:r>
+            <a:r>
+              <a:rPr lang="en-GB" sz="1600" dirty="0">
+                <a:solidFill>
+                  <a:schemeClr val="accent4">
+                    <a:lumMod val="60000"/>
+                    <a:lumOff val="40000"/>
+                  </a:schemeClr>
+                </a:solidFill>
+              </a:rPr>
+              <a:t>: Most </a:t>
+            </a:r>
+            <a:r>
+              <a:rPr lang="en-GB" sz="1600" dirty="0" smtClean="0">
+                <a:solidFill>
+                  <a:schemeClr val="accent4">
+                    <a:lumMod val="60000"/>
+                    <a:lumOff val="40000"/>
+                  </a:schemeClr>
+                </a:solidFill>
+              </a:rPr>
+              <a:t>Releases; Comedy</a:t>
+            </a:r>
+            <a:r>
+              <a:rPr lang="en-GB" sz="1600" dirty="0">
+                <a:solidFill>
+                  <a:schemeClr val="accent4">
+                    <a:lumMod val="60000"/>
+                    <a:lumOff val="40000"/>
+                  </a:schemeClr>
+                </a:solidFill>
+              </a:rPr>
+              <a:t>: Second </a:t>
+            </a:r>
+            <a:r>
+              <a:rPr lang="en-GB" sz="1600" dirty="0" smtClean="0">
+                <a:solidFill>
+                  <a:schemeClr val="accent4">
+                    <a:lumMod val="60000"/>
+                    <a:lumOff val="40000"/>
+                  </a:schemeClr>
+                </a:solidFill>
+              </a:rPr>
+              <a:t>Most</a:t>
+            </a:r>
+            <a:r>
+              <a:rPr lang="en-GB" sz="1600" dirty="0">
+                <a:solidFill>
+                  <a:schemeClr val="accent4">
+                    <a:lumMod val="60000"/>
+                    <a:lumOff val="40000"/>
+                  </a:schemeClr>
+                </a:solidFill>
+              </a:rPr>
+              <a:t>;</a:t>
+            </a:r>
+            <a:r>
+              <a:rPr lang="en-GB" sz="1600" dirty="0" smtClean="0">
+                <a:solidFill>
+                  <a:schemeClr val="accent4">
+                    <a:lumMod val="60000"/>
+                    <a:lumOff val="40000"/>
+                  </a:schemeClr>
+                </a:solidFill>
+              </a:rPr>
+              <a:t> Action</a:t>
+            </a:r>
+            <a:r>
+              <a:rPr lang="en-GB" sz="1600" dirty="0">
+                <a:solidFill>
+                  <a:schemeClr val="accent4">
+                    <a:lumMod val="60000"/>
+                    <a:lumOff val="40000"/>
+                  </a:schemeClr>
+                </a:solidFill>
+              </a:rPr>
+              <a:t>: Third </a:t>
+            </a:r>
+            <a:r>
+              <a:rPr lang="en-GB" sz="1600" dirty="0" smtClean="0">
+                <a:solidFill>
+                  <a:schemeClr val="accent4">
+                    <a:lumMod val="60000"/>
+                    <a:lumOff val="40000"/>
+                  </a:schemeClr>
+                </a:solidFill>
+              </a:rPr>
+              <a:t>Most</a:t>
+            </a:r>
+            <a:endParaRPr lang="en-US" sz="1400" b="1" dirty="0" smtClean="0">
+              <a:solidFill>
+                <a:schemeClr val="tx1"/>
+              </a:solidFill>
+            </a:endParaRPr>
+          </a:p>
+          <a:p>
+            <a:r>
+              <a:rPr lang="en-US" sz="1400" b="1" dirty="0" smtClean="0">
+                <a:solidFill>
+                  <a:schemeClr val="tx1"/>
+                </a:solidFill>
+              </a:rPr>
+              <a:t>Grouped </a:t>
+            </a:r>
+            <a:r>
+              <a:rPr lang="en-US" sz="1400" b="1" dirty="0">
+                <a:solidFill>
+                  <a:schemeClr val="tx1"/>
+                </a:solidFill>
+              </a:rPr>
+              <a:t>Genre </a:t>
+            </a:r>
+            <a:r>
+              <a:rPr lang="en-US" sz="1400" b="1" dirty="0" smtClean="0">
+                <a:solidFill>
+                  <a:schemeClr val="tx1"/>
+                </a:solidFill>
+              </a:rPr>
+              <a:t>Releases </a:t>
+            </a:r>
+            <a:r>
+              <a:rPr lang="en-US" sz="1400" dirty="0" smtClean="0">
+                <a:solidFill>
+                  <a:schemeClr val="tx1"/>
+                </a:solidFill>
+              </a:rPr>
+              <a:t>Comedy</a:t>
+            </a:r>
+            <a:r>
+              <a:rPr lang="en-US" sz="1400" dirty="0">
+                <a:solidFill>
+                  <a:schemeClr val="tx1"/>
+                </a:solidFill>
+              </a:rPr>
+              <a:t>, </a:t>
+            </a:r>
+            <a:r>
+              <a:rPr lang="en-US" sz="1400" dirty="0" err="1" smtClean="0">
+                <a:solidFill>
+                  <a:schemeClr val="tx1"/>
+                </a:solidFill>
+              </a:rPr>
+              <a:t>DramaDrama</a:t>
+            </a:r>
+            <a:r>
+              <a:rPr lang="en-US" sz="1400" dirty="0">
+                <a:solidFill>
+                  <a:schemeClr val="tx1"/>
+                </a:solidFill>
+              </a:rPr>
+              <a:t>, </a:t>
+            </a:r>
+            <a:r>
+              <a:rPr lang="en-US" sz="1400" dirty="0" err="1" smtClean="0">
+                <a:solidFill>
+                  <a:schemeClr val="tx1"/>
+                </a:solidFill>
+              </a:rPr>
+              <a:t>RomanceComedy</a:t>
+            </a:r>
+            <a:r>
+              <a:rPr lang="en-US" sz="1400" dirty="0">
+                <a:solidFill>
+                  <a:schemeClr val="tx1"/>
+                </a:solidFill>
+              </a:rPr>
+              <a:t>, Drama, </a:t>
+            </a:r>
+            <a:r>
+              <a:rPr lang="en-US" sz="1400" dirty="0" smtClean="0">
+                <a:solidFill>
+                  <a:schemeClr val="tx1"/>
+                </a:solidFill>
+              </a:rPr>
+              <a:t>Romance</a:t>
+            </a:r>
+            <a:r>
+              <a:rPr lang="en-US" dirty="0">
+                <a:solidFill>
+                  <a:schemeClr val="tx1"/>
+                </a:solidFill>
+              </a:rPr>
+              <a:t> </a:t>
+            </a:r>
+            <a:r>
+              <a:rPr lang="en-US" sz="1400" dirty="0" smtClean="0">
+                <a:solidFill>
+                  <a:schemeClr val="tx1"/>
+                </a:solidFill>
+              </a:rPr>
+              <a:t>Action</a:t>
+            </a:r>
+            <a:r>
+              <a:rPr lang="en-US" sz="1400" dirty="0">
+                <a:solidFill>
+                  <a:schemeClr val="tx1"/>
+                </a:solidFill>
+              </a:rPr>
+              <a:t>, Crime, Drama</a:t>
+            </a:r>
+          </a:p>
+          <a:p>
             <a:r>
               <a:rPr lang="en-GB" dirty="0">
                 <a:hlinkClick r:id="rId2"/>
@@ -15063,7 +15342,7 @@
         </p:blipFill>
         <p:spPr>
           <a:xfrm>
-            <a:off x="1154954" y="2844800"/>
+            <a:off x="1154954" y="2964873"/>
             <a:ext cx="9214324" cy="3786909"/>
           </a:xfrm>
           <a:prstGeom prst="rect">

</xml_diff>